<commit_message>
Fixes date on AppInventor presentation
</commit_message>
<xml_diff>
--- a/day2/appinventor/appinventor_presentation.pptx
+++ b/day2/appinventor/appinventor_presentation.pptx
@@ -273,14 +273,14 @@
           </a:ln>
           <a:extLst>
             <a:ext uri="{909E8E84-426E-40dd-AFC4-6F175D3DCCD1}">
-              <a14:hiddenFill xmlns="" xmlns:a14="http://schemas.microsoft.com/office/drawing/2010/main">
+              <a14:hiddenFill xmlns:a14="http://schemas.microsoft.com/office/drawing/2010/main" xmlns="">
                 <a:solidFill>
                   <a:schemeClr val="accent1"/>
                 </a:solidFill>
               </a14:hiddenFill>
             </a:ext>
             <a:ext uri="{91240B29-F687-4f45-9708-019B960494DF}">
-              <a14:hiddenLine xmlns="" xmlns:a14="http://schemas.microsoft.com/office/drawing/2010/main" w="9525">
+              <a14:hiddenLine xmlns:a14="http://schemas.microsoft.com/office/drawing/2010/main" xmlns="" w="9525">
                 <a:solidFill>
                   <a:schemeClr val="tx1"/>
                 </a:solidFill>
@@ -331,14 +331,14 @@
           </a:ln>
           <a:extLst>
             <a:ext uri="{909E8E84-426E-40dd-AFC4-6F175D3DCCD1}">
-              <a14:hiddenFill xmlns="" xmlns:a14="http://schemas.microsoft.com/office/drawing/2010/main">
+              <a14:hiddenFill xmlns:a14="http://schemas.microsoft.com/office/drawing/2010/main" xmlns="">
                 <a:solidFill>
                   <a:schemeClr val="accent1"/>
                 </a:solidFill>
               </a14:hiddenFill>
             </a:ext>
             <a:ext uri="{91240B29-F687-4f45-9708-019B960494DF}">
-              <a14:hiddenLine xmlns="" xmlns:a14="http://schemas.microsoft.com/office/drawing/2010/main" w="9525">
+              <a14:hiddenLine xmlns:a14="http://schemas.microsoft.com/office/drawing/2010/main" xmlns="" w="9525">
                 <a:solidFill>
                   <a:schemeClr val="tx1"/>
                 </a:solidFill>
@@ -389,14 +389,14 @@
           </a:ln>
           <a:extLst>
             <a:ext uri="{909E8E84-426E-40dd-AFC4-6F175D3DCCD1}">
-              <a14:hiddenFill xmlns="" xmlns:a14="http://schemas.microsoft.com/office/drawing/2010/main">
+              <a14:hiddenFill xmlns:a14="http://schemas.microsoft.com/office/drawing/2010/main" xmlns="">
                 <a:solidFill>
                   <a:schemeClr val="accent1"/>
                 </a:solidFill>
               </a14:hiddenFill>
             </a:ext>
             <a:ext uri="{91240B29-F687-4f45-9708-019B960494DF}">
-              <a14:hiddenLine xmlns="" xmlns:a14="http://schemas.microsoft.com/office/drawing/2010/main" w="9525">
+              <a14:hiddenLine xmlns:a14="http://schemas.microsoft.com/office/drawing/2010/main" xmlns="" w="9525">
                 <a:solidFill>
                   <a:schemeClr val="tx1"/>
                 </a:solidFill>
@@ -447,14 +447,14 @@
           </a:ln>
           <a:extLst>
             <a:ext uri="{909E8E84-426E-40dd-AFC4-6F175D3DCCD1}">
-              <a14:hiddenFill xmlns="" xmlns:a14="http://schemas.microsoft.com/office/drawing/2010/main">
+              <a14:hiddenFill xmlns:a14="http://schemas.microsoft.com/office/drawing/2010/main" xmlns="">
                 <a:solidFill>
                   <a:schemeClr val="accent1"/>
                 </a:solidFill>
               </a14:hiddenFill>
             </a:ext>
             <a:ext uri="{91240B29-F687-4f45-9708-019B960494DF}">
-              <a14:hiddenLine xmlns="" xmlns:a14="http://schemas.microsoft.com/office/drawing/2010/main" w="9525">
+              <a14:hiddenLine xmlns:a14="http://schemas.microsoft.com/office/drawing/2010/main" xmlns="" w="9525">
                 <a:solidFill>
                   <a:schemeClr val="tx1"/>
                 </a:solidFill>
@@ -546,14 +546,14 @@
           </a:ln>
           <a:extLst>
             <a:ext uri="{909E8E84-426E-40dd-AFC4-6F175D3DCCD1}">
-              <a14:hiddenFill xmlns="" xmlns:a14="http://schemas.microsoft.com/office/drawing/2010/main">
+              <a14:hiddenFill xmlns:a14="http://schemas.microsoft.com/office/drawing/2010/main" xmlns="">
                 <a:solidFill>
                   <a:schemeClr val="accent1"/>
                 </a:solidFill>
               </a14:hiddenFill>
             </a:ext>
             <a:ext uri="{91240B29-F687-4f45-9708-019B960494DF}">
-              <a14:hiddenLine xmlns="" xmlns:a14="http://schemas.microsoft.com/office/drawing/2010/main" w="9525">
+              <a14:hiddenLine xmlns:a14="http://schemas.microsoft.com/office/drawing/2010/main" xmlns="" w="9525">
                 <a:solidFill>
                   <a:schemeClr val="tx1"/>
                 </a:solidFill>
@@ -604,14 +604,14 @@
           </a:ln>
           <a:extLst>
             <a:ext uri="{909E8E84-426E-40dd-AFC4-6F175D3DCCD1}">
-              <a14:hiddenFill xmlns="" xmlns:a14="http://schemas.microsoft.com/office/drawing/2010/main">
+              <a14:hiddenFill xmlns:a14="http://schemas.microsoft.com/office/drawing/2010/main" xmlns="">
                 <a:solidFill>
                   <a:schemeClr val="accent1"/>
                 </a:solidFill>
               </a14:hiddenFill>
             </a:ext>
             <a:ext uri="{91240B29-F687-4f45-9708-019B960494DF}">
-              <a14:hiddenLine xmlns="" xmlns:a14="http://schemas.microsoft.com/office/drawing/2010/main" w="9525">
+              <a14:hiddenLine xmlns:a14="http://schemas.microsoft.com/office/drawing/2010/main" xmlns="" w="9525">
                 <a:solidFill>
                   <a:schemeClr val="tx1"/>
                 </a:solidFill>
@@ -668,7 +668,7 @@
           <a:effectLst/>
           <a:extLst>
             <a:ext uri="{AF507438-7753-43e0-B8FC-AC1667EBCBE1}">
-              <a14:hiddenEffects xmlns="" xmlns:a14="http://schemas.microsoft.com/office/drawing/2010/main">
+              <a14:hiddenEffects xmlns:a14="http://schemas.microsoft.com/office/drawing/2010/main" xmlns="">
                 <a:effectLst>
                   <a:outerShdw dist="35921" dir="2700000" algn="ctr" rotWithShape="0">
                     <a:srgbClr val="808080"/>
@@ -677,7 +677,7 @@
               </a14:hiddenEffects>
             </a:ext>
             <a:ext uri="{53640926-AAD7-44d8-BBD7-CCE9431645EC}">
-              <a14:shadowObscured xmlns="" xmlns:a14="http://schemas.microsoft.com/office/drawing/2010/main" val="1"/>
+              <a14:shadowObscured xmlns:a14="http://schemas.microsoft.com/office/drawing/2010/main" xmlns="" val="1"/>
             </a:ext>
           </a:extLst>
         </p:spPr>
@@ -706,14 +706,14 @@
           </a:ln>
           <a:extLst>
             <a:ext uri="{909E8E84-426E-40dd-AFC4-6F175D3DCCD1}">
-              <a14:hiddenFill xmlns="" xmlns:a14="http://schemas.microsoft.com/office/drawing/2010/main">
+              <a14:hiddenFill xmlns:a14="http://schemas.microsoft.com/office/drawing/2010/main" xmlns="">
                 <a:solidFill>
                   <a:schemeClr val="accent1"/>
                 </a:solidFill>
               </a14:hiddenFill>
             </a:ext>
             <a:ext uri="{91240B29-F687-4f45-9708-019B960494DF}">
-              <a14:hiddenLine xmlns="" xmlns:a14="http://schemas.microsoft.com/office/drawing/2010/main" w="9525">
+              <a14:hiddenLine xmlns:a14="http://schemas.microsoft.com/office/drawing/2010/main" xmlns="" w="9525">
                 <a:solidFill>
                   <a:schemeClr val="tx1"/>
                 </a:solidFill>
@@ -792,14 +792,14 @@
           </a:ln>
           <a:extLst>
             <a:ext uri="{909E8E84-426E-40dd-AFC4-6F175D3DCCD1}">
-              <a14:hiddenFill xmlns="" xmlns:a14="http://schemas.microsoft.com/office/drawing/2010/main">
+              <a14:hiddenFill xmlns:a14="http://schemas.microsoft.com/office/drawing/2010/main" xmlns="">
                 <a:solidFill>
                   <a:schemeClr val="accent1"/>
                 </a:solidFill>
               </a14:hiddenFill>
             </a:ext>
             <a:ext uri="{91240B29-F687-4f45-9708-019B960494DF}">
-              <a14:hiddenLine xmlns="" xmlns:a14="http://schemas.microsoft.com/office/drawing/2010/main" w="9525">
+              <a14:hiddenLine xmlns:a14="http://schemas.microsoft.com/office/drawing/2010/main" xmlns="" w="9525">
                 <a:solidFill>
                   <a:schemeClr val="tx1"/>
                 </a:solidFill>
@@ -850,14 +850,14 @@
           </a:ln>
           <a:extLst>
             <a:ext uri="{909E8E84-426E-40dd-AFC4-6F175D3DCCD1}">
-              <a14:hiddenFill xmlns="" xmlns:a14="http://schemas.microsoft.com/office/drawing/2010/main">
+              <a14:hiddenFill xmlns:a14="http://schemas.microsoft.com/office/drawing/2010/main" xmlns="">
                 <a:solidFill>
                   <a:schemeClr val="accent1"/>
                 </a:solidFill>
               </a14:hiddenFill>
             </a:ext>
             <a:ext uri="{91240B29-F687-4f45-9708-019B960494DF}">
-              <a14:hiddenLine xmlns="" xmlns:a14="http://schemas.microsoft.com/office/drawing/2010/main" w="9525">
+              <a14:hiddenLine xmlns:a14="http://schemas.microsoft.com/office/drawing/2010/main" xmlns="" w="9525">
                 <a:solidFill>
                   <a:schemeClr val="tx1"/>
                 </a:solidFill>
@@ -2194,14 +2194,14 @@
           </a:ln>
           <a:extLst>
             <a:ext uri="{909E8E84-426E-40dd-AFC4-6F175D3DCCD1}">
-              <a14:hiddenFill xmlns="" xmlns:a14="http://schemas.microsoft.com/office/drawing/2010/main">
+              <a14:hiddenFill xmlns:a14="http://schemas.microsoft.com/office/drawing/2010/main" xmlns="">
                 <a:solidFill>
                   <a:schemeClr val="accent1"/>
                 </a:solidFill>
               </a14:hiddenFill>
             </a:ext>
             <a:ext uri="{91240B29-F687-4f45-9708-019B960494DF}">
-              <a14:hiddenLine xmlns="" xmlns:a14="http://schemas.microsoft.com/office/drawing/2010/main" w="9525">
+              <a14:hiddenLine xmlns:a14="http://schemas.microsoft.com/office/drawing/2010/main" xmlns="" w="9525">
                 <a:solidFill>
                   <a:schemeClr val="tx1"/>
                 </a:solidFill>
@@ -2259,7 +2259,7 @@
           <a:noFill/>
           <a:extLst>
             <a:ext uri="{909E8E84-426E-40dd-AFC4-6F175D3DCCD1}">
-              <a14:hiddenFill xmlns="" xmlns:a14="http://schemas.microsoft.com/office/drawing/2010/main">
+              <a14:hiddenFill xmlns:a14="http://schemas.microsoft.com/office/drawing/2010/main" xmlns="">
                 <a:solidFill>
                   <a:srgbClr val="FFFFFF"/>
                 </a:solidFill>
@@ -4593,14 +4593,14 @@
           </a:ln>
           <a:extLst>
             <a:ext uri="{909E8E84-426E-40dd-AFC4-6F175D3DCCD1}">
-              <a14:hiddenFill xmlns="" xmlns:a14="http://schemas.microsoft.com/office/drawing/2010/main">
+              <a14:hiddenFill xmlns:a14="http://schemas.microsoft.com/office/drawing/2010/main" xmlns="">
                 <a:solidFill>
                   <a:schemeClr val="accent1"/>
                 </a:solidFill>
               </a14:hiddenFill>
             </a:ext>
             <a:ext uri="{91240B29-F687-4f45-9708-019B960494DF}">
-              <a14:hiddenLine xmlns="" xmlns:a14="http://schemas.microsoft.com/office/drawing/2010/main" w="9525">
+              <a14:hiddenLine xmlns:a14="http://schemas.microsoft.com/office/drawing/2010/main" xmlns="" w="9525">
                 <a:solidFill>
                   <a:schemeClr val="tx1"/>
                 </a:solidFill>
@@ -4651,14 +4651,14 @@
           </a:ln>
           <a:extLst>
             <a:ext uri="{909E8E84-426E-40dd-AFC4-6F175D3DCCD1}">
-              <a14:hiddenFill xmlns="" xmlns:a14="http://schemas.microsoft.com/office/drawing/2010/main">
+              <a14:hiddenFill xmlns:a14="http://schemas.microsoft.com/office/drawing/2010/main" xmlns="">
                 <a:solidFill>
                   <a:schemeClr val="accent1"/>
                 </a:solidFill>
               </a14:hiddenFill>
             </a:ext>
             <a:ext uri="{91240B29-F687-4f45-9708-019B960494DF}">
-              <a14:hiddenLine xmlns="" xmlns:a14="http://schemas.microsoft.com/office/drawing/2010/main" w="9525">
+              <a14:hiddenLine xmlns:a14="http://schemas.microsoft.com/office/drawing/2010/main" xmlns="" w="9525">
                 <a:solidFill>
                   <a:schemeClr val="tx1"/>
                 </a:solidFill>
@@ -4745,7 +4745,7 @@
           <a:noFill/>
           <a:extLst>
             <a:ext uri="{909E8E84-426E-40dd-AFC4-6F175D3DCCD1}">
-              <a14:hiddenFill xmlns="" xmlns:a14="http://schemas.microsoft.com/office/drawing/2010/main">
+              <a14:hiddenFill xmlns:a14="http://schemas.microsoft.com/office/drawing/2010/main" xmlns="">
                 <a:solidFill>
                   <a:srgbClr val="FFFFFF"/>
                 </a:solidFill>
@@ -4776,14 +4776,14 @@
           </a:ln>
           <a:extLst>
             <a:ext uri="{909E8E84-426E-40dd-AFC4-6F175D3DCCD1}">
-              <a14:hiddenFill xmlns="" xmlns:a14="http://schemas.microsoft.com/office/drawing/2010/main">
+              <a14:hiddenFill xmlns:a14="http://schemas.microsoft.com/office/drawing/2010/main" xmlns="">
                 <a:solidFill>
                   <a:schemeClr val="accent1"/>
                 </a:solidFill>
               </a14:hiddenFill>
             </a:ext>
             <a:ext uri="{91240B29-F687-4f45-9708-019B960494DF}">
-              <a14:hiddenLine xmlns="" xmlns:a14="http://schemas.microsoft.com/office/drawing/2010/main" w="9525">
+              <a14:hiddenLine xmlns:a14="http://schemas.microsoft.com/office/drawing/2010/main" xmlns="" w="9525">
                 <a:solidFill>
                   <a:schemeClr val="tx1"/>
                 </a:solidFill>
@@ -4833,14 +4833,14 @@
           </a:ln>
           <a:extLst>
             <a:ext uri="{909E8E84-426E-40dd-AFC4-6F175D3DCCD1}">
-              <a14:hiddenFill xmlns="" xmlns:a14="http://schemas.microsoft.com/office/drawing/2010/main">
+              <a14:hiddenFill xmlns:a14="http://schemas.microsoft.com/office/drawing/2010/main" xmlns="">
                 <a:solidFill>
                   <a:schemeClr val="accent1"/>
                 </a:solidFill>
               </a14:hiddenFill>
             </a:ext>
             <a:ext uri="{91240B29-F687-4f45-9708-019B960494DF}">
-              <a14:hiddenLine xmlns="" xmlns:a14="http://schemas.microsoft.com/office/drawing/2010/main" w="9525">
+              <a14:hiddenLine xmlns:a14="http://schemas.microsoft.com/office/drawing/2010/main" xmlns="" w="9525">
                 <a:solidFill>
                   <a:schemeClr val="tx1"/>
                 </a:solidFill>
@@ -4896,14 +4896,14 @@
           </a:ln>
           <a:extLst>
             <a:ext uri="{909E8E84-426E-40dd-AFC4-6F175D3DCCD1}">
-              <a14:hiddenFill xmlns="" xmlns:a14="http://schemas.microsoft.com/office/drawing/2010/main">
+              <a14:hiddenFill xmlns:a14="http://schemas.microsoft.com/office/drawing/2010/main" xmlns="">
                 <a:solidFill>
                   <a:schemeClr val="accent1"/>
                 </a:solidFill>
               </a14:hiddenFill>
             </a:ext>
             <a:ext uri="{91240B29-F687-4f45-9708-019B960494DF}">
-              <a14:hiddenLine xmlns="" xmlns:a14="http://schemas.microsoft.com/office/drawing/2010/main" w="9525">
+              <a14:hiddenLine xmlns:a14="http://schemas.microsoft.com/office/drawing/2010/main" xmlns="" w="9525">
                 <a:solidFill>
                   <a:schemeClr val="tx1"/>
                 </a:solidFill>
@@ -4966,7 +4966,7 @@
           </a:ln>
           <a:extLst>
             <a:ext uri="{91240B29-F687-4f45-9708-019B960494DF}">
-              <a14:hiddenLine xmlns="" xmlns:a14="http://schemas.microsoft.com/office/drawing/2010/main" w="9525">
+              <a14:hiddenLine xmlns:a14="http://schemas.microsoft.com/office/drawing/2010/main" xmlns="" w="9525">
                 <a:solidFill>
                   <a:schemeClr val="tx1"/>
                 </a:solidFill>
@@ -5538,16 +5538,20 @@
           </a:p>
           <a:p>
             <a:r>
+              <a:rPr lang="en-US" sz="1400" smtClean="0"/>
+              <a:t>19</a:t>
+            </a:r>
+            <a:r>
+              <a:rPr lang="en-US" sz="1400" baseline="30000" smtClean="0"/>
+              <a:t>th</a:t>
+            </a:r>
+            <a:r>
+              <a:rPr lang="en-US" sz="1400" smtClean="0"/>
+              <a:t> </a:t>
+            </a:r>
+            <a:r>
               <a:rPr lang="en-US" sz="1400" dirty="0" smtClean="0"/>
-              <a:t>18</a:t>
-            </a:r>
-            <a:r>
-              <a:rPr lang="en-US" sz="1400" baseline="30000" dirty="0" smtClean="0"/>
-              <a:t>th</a:t>
-            </a:r>
-            <a:r>
-              <a:rPr lang="en-US" sz="1400" dirty="0" smtClean="0"/>
-              <a:t> July 2016</a:t>
+              <a:t>July 2016</a:t>
             </a:r>
             <a:endParaRPr lang="en-US" sz="1400" dirty="0"/>
           </a:p>
@@ -5577,7 +5581,7 @@
           </a:ln>
           <a:extLst>
             <a:ext uri="{91240B29-F687-4f45-9708-019B960494DF}">
-              <a14:hiddenLine xmlns="" xmlns:a14="http://schemas.microsoft.com/office/drawing/2010/main" w="9525">
+              <a14:hiddenLine xmlns:a14="http://schemas.microsoft.com/office/drawing/2010/main" xmlns="" w="9525">
                 <a:solidFill>
                   <a:schemeClr val="tx1"/>
                 </a:solidFill>
@@ -5746,7 +5750,7 @@
           </a:ln>
           <a:extLst>
             <a:ext uri="{91240B29-F687-4f45-9708-019B960494DF}">
-              <a14:hiddenLine xmlns="" xmlns:a14="http://schemas.microsoft.com/office/drawing/2010/main" w="9525">
+              <a14:hiddenLine xmlns:a14="http://schemas.microsoft.com/office/drawing/2010/main" xmlns="" w="9525">
                 <a:solidFill>
                   <a:schemeClr val="tx1"/>
                 </a:solidFill>
@@ -5791,14 +5795,14 @@
           </a:ln>
           <a:extLst>
             <a:ext uri="{909E8E84-426E-40dd-AFC4-6F175D3DCCD1}">
-              <a14:hiddenFill xmlns="" xmlns:a14="http://schemas.microsoft.com/office/drawing/2010/main">
+              <a14:hiddenFill xmlns:a14="http://schemas.microsoft.com/office/drawing/2010/main" xmlns="">
                 <a:solidFill>
                   <a:schemeClr val="accent1"/>
                 </a:solidFill>
               </a14:hiddenFill>
             </a:ext>
             <a:ext uri="{91240B29-F687-4f45-9708-019B960494DF}">
-              <a14:hiddenLine xmlns="" xmlns:a14="http://schemas.microsoft.com/office/drawing/2010/main" w="9525">
+              <a14:hiddenLine xmlns:a14="http://schemas.microsoft.com/office/drawing/2010/main" xmlns="" w="9525">
                 <a:solidFill>
                   <a:schemeClr val="tx1"/>
                 </a:solidFill>
@@ -6648,7 +6652,7 @@
           </a:ln>
           <a:extLst>
             <a:ext uri="{91240B29-F687-4f45-9708-019B960494DF}">
-              <a14:hiddenLine xmlns="" xmlns:a14="http://schemas.microsoft.com/office/drawing/2010/main" w="9525">
+              <a14:hiddenLine xmlns:a14="http://schemas.microsoft.com/office/drawing/2010/main" xmlns="" w="9525">
                 <a:solidFill>
                   <a:schemeClr val="tx1"/>
                 </a:solidFill>
@@ -6693,14 +6697,14 @@
           </a:ln>
           <a:extLst>
             <a:ext uri="{909E8E84-426E-40dd-AFC4-6F175D3DCCD1}">
-              <a14:hiddenFill xmlns="" xmlns:a14="http://schemas.microsoft.com/office/drawing/2010/main">
+              <a14:hiddenFill xmlns:a14="http://schemas.microsoft.com/office/drawing/2010/main" xmlns="">
                 <a:solidFill>
                   <a:schemeClr val="accent1"/>
                 </a:solidFill>
               </a14:hiddenFill>
             </a:ext>
             <a:ext uri="{91240B29-F687-4f45-9708-019B960494DF}">
-              <a14:hiddenLine xmlns="" xmlns:a14="http://schemas.microsoft.com/office/drawing/2010/main" w="9525">
+              <a14:hiddenLine xmlns:a14="http://schemas.microsoft.com/office/drawing/2010/main" xmlns="" w="9525">
                 <a:solidFill>
                   <a:schemeClr val="tx1"/>
                 </a:solidFill>
@@ -6906,11 +6910,7 @@
             <a:pPr marL="1199250" lvl="1" indent="-342000"/>
             <a:r>
               <a:rPr lang="en-US" sz="1600" i="1" dirty="0" smtClean="0"/>
-              <a:t>10</a:t>
-            </a:r>
-            <a:r>
-              <a:rPr lang="en-US" sz="1600" i="1" dirty="0" smtClean="0"/>
-              <a:t>: </a:t>
+              <a:t>10: </a:t>
             </a:r>
             <a:r>
               <a:rPr lang="en-US" sz="1600" i="1" dirty="0" err="1" smtClean="0"/>
@@ -6945,15 +6945,7 @@
                   <a:srgbClr val="000000"/>
                 </a:solidFill>
               </a:rPr>
-              <a:t>11: </a:t>
-            </a:r>
-            <a:r>
-              <a:rPr lang="en-US" sz="1600" i="1" dirty="0" smtClean="0">
-                <a:solidFill>
-                  <a:srgbClr val="000000"/>
-                </a:solidFill>
-              </a:rPr>
-              <a:t>Kino: </a:t>
+              <a:t>11: Kino: </a:t>
             </a:r>
             <a:r>
               <a:rPr lang="en-US" sz="1600" dirty="0">
@@ -7524,7 +7516,7 @@
           </a:ln>
           <a:extLst>
             <a:ext uri="{91240B29-F687-4f45-9708-019B960494DF}">
-              <a14:hiddenLine xmlns="" xmlns:a14="http://schemas.microsoft.com/office/drawing/2010/main" w="9525">
+              <a14:hiddenLine xmlns:a14="http://schemas.microsoft.com/office/drawing/2010/main" xmlns="" w="9525">
                 <a:solidFill>
                   <a:schemeClr val="tx1"/>
                 </a:solidFill>
@@ -7569,14 +7561,14 @@
           </a:ln>
           <a:extLst>
             <a:ext uri="{909E8E84-426E-40dd-AFC4-6F175D3DCCD1}">
-              <a14:hiddenFill xmlns="" xmlns:a14="http://schemas.microsoft.com/office/drawing/2010/main">
+              <a14:hiddenFill xmlns:a14="http://schemas.microsoft.com/office/drawing/2010/main" xmlns="">
                 <a:solidFill>
                   <a:schemeClr val="accent1"/>
                 </a:solidFill>
               </a14:hiddenFill>
             </a:ext>
             <a:ext uri="{91240B29-F687-4f45-9708-019B960494DF}">
-              <a14:hiddenLine xmlns="" xmlns:a14="http://schemas.microsoft.com/office/drawing/2010/main" w="9525">
+              <a14:hiddenLine xmlns:a14="http://schemas.microsoft.com/office/drawing/2010/main" xmlns="" w="9525">
                 <a:solidFill>
                   <a:schemeClr val="tx1"/>
                 </a:solidFill>
@@ -7779,50 +7771,26 @@
                   <a:srgbClr val="000000"/>
                 </a:solidFill>
               </a:rPr>
-              <a:t> </a:t>
-            </a:r>
+              <a:t> Used in Education?</a:t>
+            </a:r>
+          </a:p>
+          <a:p>
+            <a:pPr marL="342000" indent="-342000"/>
+            <a:endParaRPr lang="en-US" dirty="0">
+              <a:solidFill>
+                <a:srgbClr val="000000"/>
+              </a:solidFill>
+            </a:endParaRPr>
+          </a:p>
+          <a:p>
+            <a:pPr marL="342000" indent="-342000"/>
             <a:r>
               <a:rPr lang="en-US" sz="2000" dirty="0" smtClean="0">
                 <a:solidFill>
                   <a:srgbClr val="000000"/>
                 </a:solidFill>
               </a:rPr>
-              <a:t>Used </a:t>
-            </a:r>
-            <a:r>
-              <a:rPr lang="en-US" sz="2000" dirty="0" smtClean="0">
-                <a:solidFill>
-                  <a:srgbClr val="000000"/>
-                </a:solidFill>
-              </a:rPr>
-              <a:t>in Education?</a:t>
-            </a:r>
-          </a:p>
-          <a:p>
-            <a:pPr marL="342000" indent="-342000"/>
-            <a:endParaRPr lang="en-US" dirty="0">
-              <a:solidFill>
-                <a:srgbClr val="000000"/>
-              </a:solidFill>
-            </a:endParaRPr>
-          </a:p>
-          <a:p>
-            <a:pPr marL="342000" indent="-342000"/>
-            <a:r>
-              <a:rPr lang="en-US" sz="2000" dirty="0" smtClean="0">
-                <a:solidFill>
-                  <a:srgbClr val="000000"/>
-                </a:solidFill>
-              </a:rPr>
-              <a:t>What </a:t>
-            </a:r>
-            <a:r>
-              <a:rPr lang="en-US" sz="2000" dirty="0" smtClean="0">
-                <a:solidFill>
-                  <a:srgbClr val="000000"/>
-                </a:solidFill>
-              </a:rPr>
-              <a:t>Can </a:t>
+              <a:t>What Can </a:t>
             </a:r>
             <a:r>
               <a:rPr lang="en-US" sz="2000" dirty="0">
@@ -7838,31 +7806,7 @@
                   <a:srgbClr val="000000"/>
                 </a:solidFill>
               </a:rPr>
-              <a:t>ou </a:t>
-            </a:r>
-            <a:r>
-              <a:rPr lang="en-US" sz="2000" dirty="0" smtClean="0">
-                <a:solidFill>
-                  <a:srgbClr val="000000"/>
-                </a:solidFill>
-              </a:rPr>
-              <a:t>Create</a:t>
-            </a:r>
-            <a:r>
-              <a:rPr lang="en-US" sz="2000" dirty="0" smtClean="0">
-                <a:solidFill>
-                  <a:srgbClr val="000000"/>
-                </a:solidFill>
-              </a:rPr>
-              <a:t> </a:t>
-            </a:r>
-            <a:r>
-              <a:rPr lang="en-US" sz="2000" dirty="0" smtClean="0">
-                <a:solidFill>
-                  <a:srgbClr val="000000"/>
-                </a:solidFill>
-              </a:rPr>
-              <a:t>with </a:t>
+              <a:t>ou Create with </a:t>
             </a:r>
             <a:r>
               <a:rPr lang="en-US" sz="2000" dirty="0" err="1" smtClean="0">
@@ -8205,7 +8149,7 @@
           </a:ln>
           <a:extLst>
             <a:ext uri="{91240B29-F687-4f45-9708-019B960494DF}">
-              <a14:hiddenLine xmlns="" xmlns:a14="http://schemas.microsoft.com/office/drawing/2010/main" w="9525">
+              <a14:hiddenLine xmlns:a14="http://schemas.microsoft.com/office/drawing/2010/main" xmlns="" w="9525">
                 <a:solidFill>
                   <a:schemeClr val="tx1"/>
                 </a:solidFill>
@@ -8250,14 +8194,14 @@
           </a:ln>
           <a:extLst>
             <a:ext uri="{909E8E84-426E-40dd-AFC4-6F175D3DCCD1}">
-              <a14:hiddenFill xmlns="" xmlns:a14="http://schemas.microsoft.com/office/drawing/2010/main">
+              <a14:hiddenFill xmlns:a14="http://schemas.microsoft.com/office/drawing/2010/main" xmlns="">
                 <a:solidFill>
                   <a:schemeClr val="accent1"/>
                 </a:solidFill>
               </a14:hiddenFill>
             </a:ext>
             <a:ext uri="{91240B29-F687-4f45-9708-019B960494DF}">
-              <a14:hiddenLine xmlns="" xmlns:a14="http://schemas.microsoft.com/office/drawing/2010/main" w="9525">
+              <a14:hiddenLine xmlns:a14="http://schemas.microsoft.com/office/drawing/2010/main" xmlns="" w="9525">
                 <a:solidFill>
                   <a:schemeClr val="tx1"/>
                 </a:solidFill>
@@ -8772,7 +8716,7 @@
           </a:ln>
           <a:extLst>
             <a:ext uri="{91240B29-F687-4f45-9708-019B960494DF}">
-              <a14:hiddenLine xmlns="" xmlns:a14="http://schemas.microsoft.com/office/drawing/2010/main" w="9525">
+              <a14:hiddenLine xmlns:a14="http://schemas.microsoft.com/office/drawing/2010/main" xmlns="" w="9525">
                 <a:solidFill>
                   <a:schemeClr val="tx1"/>
                 </a:solidFill>
@@ -8817,14 +8761,14 @@
           </a:ln>
           <a:extLst>
             <a:ext uri="{909E8E84-426E-40dd-AFC4-6F175D3DCCD1}">
-              <a14:hiddenFill xmlns="" xmlns:a14="http://schemas.microsoft.com/office/drawing/2010/main">
+              <a14:hiddenFill xmlns:a14="http://schemas.microsoft.com/office/drawing/2010/main" xmlns="">
                 <a:solidFill>
                   <a:schemeClr val="accent1"/>
                 </a:solidFill>
               </a14:hiddenFill>
             </a:ext>
             <a:ext uri="{91240B29-F687-4f45-9708-019B960494DF}">
-              <a14:hiddenLine xmlns="" xmlns:a14="http://schemas.microsoft.com/office/drawing/2010/main" w="9525">
+              <a14:hiddenLine xmlns:a14="http://schemas.microsoft.com/office/drawing/2010/main" xmlns="" w="9525">
                 <a:solidFill>
                   <a:schemeClr val="tx1"/>
                 </a:solidFill>
@@ -9503,7 +9447,7 @@
           </a:ln>
           <a:extLst>
             <a:ext uri="{91240B29-F687-4f45-9708-019B960494DF}">
-              <a14:hiddenLine xmlns="" xmlns:a14="http://schemas.microsoft.com/office/drawing/2010/main" w="9525">
+              <a14:hiddenLine xmlns:a14="http://schemas.microsoft.com/office/drawing/2010/main" xmlns="" w="9525">
                 <a:solidFill>
                   <a:schemeClr val="tx1"/>
                 </a:solidFill>
@@ -9548,14 +9492,14 @@
           </a:ln>
           <a:extLst>
             <a:ext uri="{909E8E84-426E-40dd-AFC4-6F175D3DCCD1}">
-              <a14:hiddenFill xmlns="" xmlns:a14="http://schemas.microsoft.com/office/drawing/2010/main">
+              <a14:hiddenFill xmlns:a14="http://schemas.microsoft.com/office/drawing/2010/main" xmlns="">
                 <a:solidFill>
                   <a:schemeClr val="accent1"/>
                 </a:solidFill>
               </a14:hiddenFill>
             </a:ext>
             <a:ext uri="{91240B29-F687-4f45-9708-019B960494DF}">
-              <a14:hiddenLine xmlns="" xmlns:a14="http://schemas.microsoft.com/office/drawing/2010/main" w="9525">
+              <a14:hiddenLine xmlns:a14="http://schemas.microsoft.com/office/drawing/2010/main" xmlns="" w="9525">
                 <a:solidFill>
                   <a:schemeClr val="tx1"/>
                 </a:solidFill>
@@ -9983,7 +9927,7 @@
           </a:ln>
           <a:extLst>
             <a:ext uri="{91240B29-F687-4f45-9708-019B960494DF}">
-              <a14:hiddenLine xmlns="" xmlns:a14="http://schemas.microsoft.com/office/drawing/2010/main" w="9525">
+              <a14:hiddenLine xmlns:a14="http://schemas.microsoft.com/office/drawing/2010/main" xmlns="" w="9525">
                 <a:solidFill>
                   <a:schemeClr val="tx1"/>
                 </a:solidFill>
@@ -10028,14 +9972,14 @@
           </a:ln>
           <a:extLst>
             <a:ext uri="{909E8E84-426E-40dd-AFC4-6F175D3DCCD1}">
-              <a14:hiddenFill xmlns="" xmlns:a14="http://schemas.microsoft.com/office/drawing/2010/main">
+              <a14:hiddenFill xmlns:a14="http://schemas.microsoft.com/office/drawing/2010/main" xmlns="">
                 <a:solidFill>
                   <a:schemeClr val="accent1"/>
                 </a:solidFill>
               </a14:hiddenFill>
             </a:ext>
             <a:ext uri="{91240B29-F687-4f45-9708-019B960494DF}">
-              <a14:hiddenLine xmlns="" xmlns:a14="http://schemas.microsoft.com/office/drawing/2010/main" w="9525">
+              <a14:hiddenLine xmlns:a14="http://schemas.microsoft.com/office/drawing/2010/main" xmlns="" w="9525">
                 <a:solidFill>
                   <a:schemeClr val="tx1"/>
                 </a:solidFill>
@@ -10264,11 +10208,6 @@
               </a:rPr>
               <a:t>10</a:t>
             </a:r>
-            <a:endParaRPr lang="en-AU" sz="1800" baseline="30000" dirty="0" smtClean="0">
-              <a:solidFill>
-                <a:srgbClr val="000000"/>
-              </a:solidFill>
-            </a:endParaRPr>
           </a:p>
           <a:p>
             <a:pPr marL="1199250" lvl="1" indent="-342000"/>
@@ -10493,7 +10432,7 @@
           </a:ln>
           <a:extLst>
             <a:ext uri="{91240B29-F687-4f45-9708-019B960494DF}">
-              <a14:hiddenLine xmlns="" xmlns:a14="http://schemas.microsoft.com/office/drawing/2010/main" w="9525">
+              <a14:hiddenLine xmlns:a14="http://schemas.microsoft.com/office/drawing/2010/main" xmlns="" w="9525">
                 <a:solidFill>
                   <a:schemeClr val="tx1"/>
                 </a:solidFill>
@@ -10538,14 +10477,14 @@
           </a:ln>
           <a:extLst>
             <a:ext uri="{909E8E84-426E-40dd-AFC4-6F175D3DCCD1}">
-              <a14:hiddenFill xmlns="" xmlns:a14="http://schemas.microsoft.com/office/drawing/2010/main">
+              <a14:hiddenFill xmlns:a14="http://schemas.microsoft.com/office/drawing/2010/main" xmlns="">
                 <a:solidFill>
                   <a:schemeClr val="accent1"/>
                 </a:solidFill>
               </a14:hiddenFill>
             </a:ext>
             <a:ext uri="{91240B29-F687-4f45-9708-019B960494DF}">
-              <a14:hiddenLine xmlns="" xmlns:a14="http://schemas.microsoft.com/office/drawing/2010/main" w="9525">
+              <a14:hiddenLine xmlns:a14="http://schemas.microsoft.com/office/drawing/2010/main" xmlns="" w="9525">
                 <a:solidFill>
                   <a:schemeClr val="tx1"/>
                 </a:solidFill>
@@ -10945,7 +10884,7 @@
           </a:ln>
           <a:extLst>
             <a:ext uri="{91240B29-F687-4f45-9708-019B960494DF}">
-              <a14:hiddenLine xmlns="" xmlns:a14="http://schemas.microsoft.com/office/drawing/2010/main" w="9525">
+              <a14:hiddenLine xmlns:a14="http://schemas.microsoft.com/office/drawing/2010/main" xmlns="" w="9525">
                 <a:solidFill>
                   <a:schemeClr val="tx1"/>
                 </a:solidFill>
@@ -10990,14 +10929,14 @@
           </a:ln>
           <a:extLst>
             <a:ext uri="{909E8E84-426E-40dd-AFC4-6F175D3DCCD1}">
-              <a14:hiddenFill xmlns="" xmlns:a14="http://schemas.microsoft.com/office/drawing/2010/main">
+              <a14:hiddenFill xmlns:a14="http://schemas.microsoft.com/office/drawing/2010/main" xmlns="">
                 <a:solidFill>
                   <a:schemeClr val="accent1"/>
                 </a:solidFill>
               </a14:hiddenFill>
             </a:ext>
             <a:ext uri="{91240B29-F687-4f45-9708-019B960494DF}">
-              <a14:hiddenLine xmlns="" xmlns:a14="http://schemas.microsoft.com/office/drawing/2010/main" w="9525">
+              <a14:hiddenLine xmlns:a14="http://schemas.microsoft.com/office/drawing/2010/main" xmlns="" w="9525">
                 <a:solidFill>
                   <a:schemeClr val="tx1"/>
                 </a:solidFill>
@@ -11173,47 +11112,31 @@
                   <a:srgbClr val="000000"/>
                 </a:solidFill>
               </a:rPr>
-              <a:t> activities available on the workshop </a:t>
-            </a:r>
+              <a:t> activities available on the workshop website</a:t>
+            </a:r>
+            <a:endParaRPr lang="en-US" sz="2000" baseline="30000" dirty="0" smtClean="0">
+              <a:solidFill>
+                <a:srgbClr val="000000"/>
+              </a:solidFill>
+            </a:endParaRPr>
+          </a:p>
+          <a:p>
+            <a:pPr marL="342000" indent="-342000"/>
+            <a:endParaRPr lang="en-US" sz="2000" dirty="0">
+              <a:solidFill>
+                <a:srgbClr val="000000"/>
+              </a:solidFill>
+            </a:endParaRPr>
+          </a:p>
+          <a:p>
+            <a:pPr marL="342000" indent="-342000"/>
             <a:r>
               <a:rPr lang="en-US" sz="2000" dirty="0" smtClean="0">
                 <a:solidFill>
                   <a:srgbClr val="000000"/>
                 </a:solidFill>
               </a:rPr>
-              <a:t>website</a:t>
-            </a:r>
-            <a:endParaRPr lang="en-US" sz="2000" baseline="30000" dirty="0" smtClean="0">
-              <a:solidFill>
-                <a:srgbClr val="000000"/>
-              </a:solidFill>
-            </a:endParaRPr>
-          </a:p>
-          <a:p>
-            <a:pPr marL="342000" indent="-342000"/>
-            <a:endParaRPr lang="en-US" sz="2000" dirty="0">
-              <a:solidFill>
-                <a:srgbClr val="000000"/>
-              </a:solidFill>
-            </a:endParaRPr>
-          </a:p>
-          <a:p>
-            <a:pPr marL="342000" indent="-342000"/>
-            <a:r>
-              <a:rPr lang="en-US" sz="2000" dirty="0" smtClean="0">
-                <a:solidFill>
-                  <a:srgbClr val="000000"/>
-                </a:solidFill>
-              </a:rPr>
-              <a:t>We recommend that  you complete this in the order on the </a:t>
-            </a:r>
-            <a:r>
-              <a:rPr lang="en-US" sz="2000" dirty="0" smtClean="0">
-                <a:solidFill>
-                  <a:srgbClr val="000000"/>
-                </a:solidFill>
-              </a:rPr>
-              <a:t>site</a:t>
+              <a:t>We recommend that  you complete this in the order on the site</a:t>
             </a:r>
             <a:endParaRPr lang="en-US" sz="2000" baseline="30000" dirty="0" smtClean="0">
               <a:solidFill>
@@ -11253,15 +11176,7 @@
                   <a:srgbClr val="000000"/>
                 </a:solidFill>
               </a:rPr>
-              <a:t> features that you can use or would like to complete different tutorials, please let us </a:t>
-            </a:r>
-            <a:r>
-              <a:rPr lang="en-US" sz="2000" dirty="0" smtClean="0">
-                <a:solidFill>
-                  <a:srgbClr val="000000"/>
-                </a:solidFill>
-              </a:rPr>
-              <a:t>know</a:t>
+              <a:t> features that you can use or would like to complete different tutorials, please let us know</a:t>
             </a:r>
             <a:endParaRPr lang="en-US" sz="2000" baseline="30000" dirty="0" smtClean="0">
               <a:solidFill>
@@ -11479,7 +11394,7 @@
           </a:ln>
           <a:extLst>
             <a:ext uri="{91240B29-F687-4f45-9708-019B960494DF}">
-              <a14:hiddenLine xmlns="" xmlns:a14="http://schemas.microsoft.com/office/drawing/2010/main" w="9525">
+              <a14:hiddenLine xmlns:a14="http://schemas.microsoft.com/office/drawing/2010/main" xmlns="" w="9525">
                 <a:solidFill>
                   <a:schemeClr val="tx1"/>
                 </a:solidFill>
@@ -11524,14 +11439,14 @@
           </a:ln>
           <a:extLst>
             <a:ext uri="{909E8E84-426E-40dd-AFC4-6F175D3DCCD1}">
-              <a14:hiddenFill xmlns="" xmlns:a14="http://schemas.microsoft.com/office/drawing/2010/main">
+              <a14:hiddenFill xmlns:a14="http://schemas.microsoft.com/office/drawing/2010/main" xmlns="">
                 <a:solidFill>
                   <a:schemeClr val="accent1"/>
                 </a:solidFill>
               </a14:hiddenFill>
             </a:ext>
             <a:ext uri="{91240B29-F687-4f45-9708-019B960494DF}">
-              <a14:hiddenLine xmlns="" xmlns:a14="http://schemas.microsoft.com/office/drawing/2010/main" w="9525">
+              <a14:hiddenLine xmlns:a14="http://schemas.microsoft.com/office/drawing/2010/main" xmlns="" w="9525">
                 <a:solidFill>
                   <a:schemeClr val="tx1"/>
                 </a:solidFill>
@@ -12256,7 +12171,7 @@
         <a:effectLst/>
         <a:extLst>
           <a:ext uri="{AF507438-7753-43e0-B8FC-AC1667EBCBE1}">
-            <a14:hiddenEffects xmlns="" xmlns:a14="http://schemas.microsoft.com/office/drawing/2010/main">
+            <a14:hiddenEffects xmlns:a14="http://schemas.microsoft.com/office/drawing/2010/main" xmlns="">
               <a:effectLst>
                 <a:outerShdw dist="35921" dir="2700000" algn="ctr" rotWithShape="0">
                   <a:schemeClr val="bg2"/>
@@ -12330,7 +12245,7 @@
         <a:effectLst/>
         <a:extLst>
           <a:ext uri="{AF507438-7753-43e0-B8FC-AC1667EBCBE1}">
-            <a14:hiddenEffects xmlns="" xmlns:a14="http://schemas.microsoft.com/office/drawing/2010/main">
+            <a14:hiddenEffects xmlns:a14="http://schemas.microsoft.com/office/drawing/2010/main" xmlns="">
               <a:effectLst>
                 <a:outerShdw dist="35921" dir="2700000" algn="ctr" rotWithShape="0">
                   <a:schemeClr val="bg2"/>

</xml_diff>